<commit_message>
Four Up Chart Week 4
</commit_message>
<xml_diff>
--- a/Documentation/accounting (group 5)/FourUpCharts.pptx
+++ b/Documentation/accounting (group 5)/FourUpCharts.pptx
@@ -10,6 +10,7 @@
   <p:sldIdLst>
     <p:sldId id="256" r:id="rId5"/>
     <p:sldId id="257" r:id="rId6"/>
+    <p:sldId id="258" r:id="rId7"/>
   </p:sldIdLst>
   <p:sldSz cy="5143500" cx="9144000"/>
   <p:notesSz cx="6858000" cy="9144000"/>
@@ -641,6 +642,128 @@
       <p:sp>
         <p:nvSpPr>
           <p:cNvPr id="92" name="Shape 92"/>
+          <p:cNvSpPr txBox="1"/>
+          <p:nvPr>
+            <p:ph idx="1" type="body"/>
+          </p:nvPr>
+        </p:nvSpPr>
+        <p:spPr>
+          <a:xfrm>
+            <a:off x="685800" y="4343400"/>
+            <a:ext cx="5486399" cy="4114800"/>
+          </a:xfrm>
+          <a:prstGeom prst="rect">
+            <a:avLst/>
+          </a:prstGeom>
+          <a:noFill/>
+          <a:ln>
+            <a:noFill/>
+          </a:ln>
+        </p:spPr>
+        <p:txBody>
+          <a:bodyPr anchorCtr="0" anchor="t" bIns="91425" lIns="91425" rIns="91425" tIns="91425">
+            <a:noAutofit/>
+          </a:bodyPr>
+          <a:lstStyle/>
+          <a:p>
+            <a:pPr indent="0" lvl="0" marL="0" marR="0" rtl="0" algn="l">
+              <a:spcBef>
+                <a:spcPts val="0"/>
+              </a:spcBef>
+              <a:buClr>
+                <a:schemeClr val="dk1"/>
+              </a:buClr>
+              <a:buSzPct val="25000"/>
+              <a:buFont typeface="Arial"/>
+              <a:buNone/>
+            </a:pPr>
+            <a:r>
+              <a:t/>
+            </a:r>
+            <a:endParaRPr b="0" i="0" sz="1100" u="none" cap="none" strike="noStrike">
+              <a:solidFill>
+                <a:schemeClr val="dk1"/>
+              </a:solidFill>
+              <a:latin typeface="Arial"/>
+              <a:ea typeface="Arial"/>
+              <a:cs typeface="Arial"/>
+              <a:sym typeface="Arial"/>
+            </a:endParaRPr>
+          </a:p>
+        </p:txBody>
+      </p:sp>
+    </p:spTree>
+  </p:cSld>
+  <p:clrMapOvr>
+    <a:masterClrMapping/>
+  </p:clrMapOvr>
+</p:notes>
+</file>
+
+<file path=ppt/notesSlides/notesSlide3.xml><?xml version="1.0" encoding="utf-8"?>
+<p:notes xmlns:a="http://schemas.openxmlformats.org/drawingml/2006/main" xmlns:r="http://schemas.openxmlformats.org/officeDocument/2006/relationships" xmlns:mc="http://schemas.openxmlformats.org/markup-compatibility/2006" xmlns:mv="urn:schemas-microsoft-com:mac:vml" xmlns:p="http://schemas.openxmlformats.org/presentationml/2006/main" xmlns:c="http://schemas.openxmlformats.org/drawingml/2006/chart" xmlns:dgm="http://schemas.openxmlformats.org/drawingml/2006/diagram" xmlns:o="urn:schemas-microsoft-com:office:office" xmlns:v="urn:schemas-microsoft-com:vml" xmlns:pvml="urn:schemas-microsoft-com:office:powerpoint" xmlns:com="http://schemas.openxmlformats.org/drawingml/2006/compatibility" xmlns:p14="http://schemas.microsoft.com/office/powerpoint/2010/main" showMasterPhAnim="0" showMasterSp="0">
+  <p:cSld>
+    <p:spTree>
+      <p:nvGrpSpPr>
+        <p:cNvPr id="99" name="Shape 99"/>
+        <p:cNvGrpSpPr/>
+        <p:nvPr/>
+      </p:nvGrpSpPr>
+      <p:grpSpPr>
+        <a:xfrm>
+          <a:off x="0" y="0"/>
+          <a:ext cx="0" cy="0"/>
+          <a:chOff x="0" y="0"/>
+          <a:chExt cx="0" cy="0"/>
+        </a:xfrm>
+      </p:grpSpPr>
+      <p:sp>
+        <p:nvSpPr>
+          <p:cNvPr id="100" name="Shape 100"/>
+          <p:cNvSpPr/>
+          <p:nvPr>
+            <p:ph idx="2" type="sldImg"/>
+          </p:nvPr>
+        </p:nvSpPr>
+        <p:spPr>
+          <a:xfrm>
+            <a:off x="381000" y="685800"/>
+            <a:ext cx="6096000" cy="3429000"/>
+          </a:xfrm>
+          <a:custGeom>
+            <a:pathLst>
+              <a:path extrusionOk="0" h="120000" w="120000">
+                <a:moveTo>
+                  <a:pt x="0" y="0"/>
+                </a:moveTo>
+                <a:lnTo>
+                  <a:pt x="120000" y="0"/>
+                </a:lnTo>
+                <a:lnTo>
+                  <a:pt x="120000" y="120000"/>
+                </a:lnTo>
+                <a:lnTo>
+                  <a:pt x="0" y="120000"/>
+                </a:lnTo>
+                <a:close/>
+              </a:path>
+            </a:pathLst>
+          </a:custGeom>
+          <a:noFill/>
+          <a:ln cap="flat" cmpd="sng" w="9525">
+            <a:solidFill>
+              <a:srgbClr val="000000"/>
+            </a:solidFill>
+            <a:prstDash val="solid"/>
+            <a:round/>
+            <a:headEnd len="med" w="med" type="none"/>
+            <a:tailEnd len="med" w="med" type="none"/>
+          </a:ln>
+        </p:spPr>
+      </p:sp>
+      <p:sp>
+        <p:nvSpPr>
+          <p:cNvPr id="101" name="Shape 101"/>
           <p:cNvSpPr txBox="1"/>
           <p:nvPr>
             <p:ph idx="1" type="body"/>
@@ -13703,6 +13826,451 @@
         <p:spPr>
           <a:xfrm>
             <a:off x="437464" y="542937"/>
+            <a:ext cx="4077600" cy="2291999"/>
+          </a:xfrm>
+          <a:prstGeom prst="rect">
+            <a:avLst/>
+          </a:prstGeom>
+          <a:noFill/>
+          <a:ln>
+            <a:noFill/>
+          </a:ln>
+        </p:spPr>
+        <p:txBody>
+          <a:bodyPr anchorCtr="0" anchor="t" bIns="91425" lIns="91425" rIns="91425" tIns="91425">
+            <a:noAutofit/>
+          </a:bodyPr>
+          <a:lstStyle/>
+          <a:p>
+            <a:pPr indent="-171450" lvl="0" marL="171450" marR="0" rtl="0" algn="l">
+              <a:lnSpc>
+                <a:spcPct val="90000"/>
+              </a:lnSpc>
+              <a:spcBef>
+                <a:spcPts val="0"/>
+              </a:spcBef>
+              <a:spcAft>
+                <a:spcPts val="0"/>
+              </a:spcAft>
+              <a:buClr>
+                <a:schemeClr val="dk1"/>
+              </a:buClr>
+              <a:buSzPct val="25000"/>
+              <a:buFont typeface="Arial"/>
+              <a:buNone/>
+            </a:pPr>
+            <a:r>
+              <a:rPr b="1" i="0" lang="en" sz="1800" u="none" cap="none" strike="noStrike">
+                <a:solidFill>
+                  <a:schemeClr val="dk1"/>
+                </a:solidFill>
+                <a:latin typeface="Calibri"/>
+                <a:ea typeface="Calibri"/>
+                <a:cs typeface="Calibri"/>
+                <a:sym typeface="Calibri"/>
+              </a:rPr>
+              <a:t>Progress</a:t>
+            </a:r>
+          </a:p>
+          <a:p>
+            <a:pPr indent="-317500" lvl="0" marL="457200" marR="0" rtl="0" algn="l">
+              <a:lnSpc>
+                <a:spcPct val="90000"/>
+              </a:lnSpc>
+              <a:spcBef>
+                <a:spcPts val="0"/>
+              </a:spcBef>
+              <a:buClr>
+                <a:schemeClr val="dk1"/>
+              </a:buClr>
+              <a:buSzPct val="100000"/>
+              <a:buFont typeface="Calibri"/>
+            </a:pPr>
+            <a:r>
+              <a:rPr lang="en" sz="1400"/>
+              <a:t>We chose Odoo</a:t>
+            </a:r>
+          </a:p>
+        </p:txBody>
+      </p:sp>
+      <p:sp>
+        <p:nvSpPr>
+          <p:cNvPr id="95" name="Shape 95"/>
+          <p:cNvSpPr txBox="1"/>
+          <p:nvPr>
+            <p:ph idx="1" type="body"/>
+          </p:nvPr>
+        </p:nvSpPr>
+        <p:spPr>
+          <a:xfrm>
+            <a:off x="436777" y="2851150"/>
+            <a:ext cx="4078200" cy="2292300"/>
+          </a:xfrm>
+          <a:prstGeom prst="rect">
+            <a:avLst/>
+          </a:prstGeom>
+          <a:noFill/>
+          <a:ln>
+            <a:noFill/>
+          </a:ln>
+        </p:spPr>
+        <p:txBody>
+          <a:bodyPr anchorCtr="0" anchor="t" bIns="91425" lIns="91425" rIns="91425" tIns="91425">
+            <a:noAutofit/>
+          </a:bodyPr>
+          <a:lstStyle/>
+          <a:p>
+            <a:pPr indent="-171450" lvl="0" marL="171450" marR="0" rtl="0" algn="l">
+              <a:lnSpc>
+                <a:spcPct val="90000"/>
+              </a:lnSpc>
+              <a:spcBef>
+                <a:spcPts val="0"/>
+              </a:spcBef>
+              <a:spcAft>
+                <a:spcPts val="0"/>
+              </a:spcAft>
+              <a:buClr>
+                <a:schemeClr val="dk1"/>
+              </a:buClr>
+              <a:buSzPct val="25000"/>
+              <a:buFont typeface="Arial"/>
+              <a:buNone/>
+            </a:pPr>
+            <a:r>
+              <a:rPr b="1" i="0" lang="en" sz="1800" u="none" cap="none" strike="noStrike">
+                <a:solidFill>
+                  <a:schemeClr val="dk1"/>
+                </a:solidFill>
+                <a:latin typeface="Calibri"/>
+                <a:ea typeface="Calibri"/>
+                <a:cs typeface="Calibri"/>
+                <a:sym typeface="Calibri"/>
+              </a:rPr>
+              <a:t>Risks</a:t>
+            </a:r>
+          </a:p>
+          <a:p>
+            <a:pPr indent="-317500" lvl="0" marL="457200" marR="0" rtl="0" algn="l">
+              <a:lnSpc>
+                <a:spcPct val="90000"/>
+              </a:lnSpc>
+              <a:spcBef>
+                <a:spcPts val="0"/>
+              </a:spcBef>
+              <a:buSzPct val="100000"/>
+            </a:pPr>
+            <a:r>
+              <a:rPr lang="en" sz="1400"/>
+              <a:t>Most teams move off of Odoo and we have to consider if we want to move off as well.</a:t>
+            </a:r>
+          </a:p>
+          <a:p>
+            <a:pPr indent="0" lvl="0" marL="0" marR="0" rtl="0" algn="l">
+              <a:lnSpc>
+                <a:spcPct val="90000"/>
+              </a:lnSpc>
+              <a:spcBef>
+                <a:spcPts val="0"/>
+              </a:spcBef>
+              <a:buNone/>
+            </a:pPr>
+            <a:r>
+              <a:t/>
+            </a:r>
+            <a:endParaRPr sz="1400"/>
+          </a:p>
+          <a:p>
+            <a:pPr indent="-317500" lvl="0" marL="457200" marR="0" rtl="0" algn="l">
+              <a:lnSpc>
+                <a:spcPct val="90000"/>
+              </a:lnSpc>
+              <a:spcBef>
+                <a:spcPts val="0"/>
+              </a:spcBef>
+              <a:buSzPct val="100000"/>
+            </a:pPr>
+            <a:r>
+              <a:rPr lang="en" sz="1400"/>
+              <a:t>Odoo actually ends up being incredibly difficult to manage despite the simplicity it portrays on the surface.</a:t>
+            </a:r>
+          </a:p>
+        </p:txBody>
+      </p:sp>
+      <p:sp>
+        <p:nvSpPr>
+          <p:cNvPr id="96" name="Shape 96"/>
+          <p:cNvSpPr txBox="1"/>
+          <p:nvPr>
+            <p:ph idx="1" type="body"/>
+          </p:nvPr>
+        </p:nvSpPr>
+        <p:spPr>
+          <a:xfrm>
+            <a:off x="4611801" y="542585"/>
+            <a:ext cx="4078200" cy="2292300"/>
+          </a:xfrm>
+          <a:prstGeom prst="rect">
+            <a:avLst/>
+          </a:prstGeom>
+          <a:noFill/>
+          <a:ln>
+            <a:noFill/>
+          </a:ln>
+        </p:spPr>
+        <p:txBody>
+          <a:bodyPr anchorCtr="0" anchor="t" bIns="91425" lIns="91425" rIns="91425" tIns="91425">
+            <a:noAutofit/>
+          </a:bodyPr>
+          <a:lstStyle/>
+          <a:p>
+            <a:pPr indent="-171450" lvl="0" marL="171450" marR="0" rtl="0" algn="l">
+              <a:lnSpc>
+                <a:spcPct val="90000"/>
+              </a:lnSpc>
+              <a:spcBef>
+                <a:spcPts val="0"/>
+              </a:spcBef>
+              <a:spcAft>
+                <a:spcPts val="0"/>
+              </a:spcAft>
+              <a:buClr>
+                <a:schemeClr val="dk1"/>
+              </a:buClr>
+              <a:buSzPct val="25000"/>
+              <a:buFont typeface="Arial"/>
+              <a:buNone/>
+            </a:pPr>
+            <a:r>
+              <a:rPr b="1" i="0" lang="en" sz="1800" u="none" cap="none" strike="noStrike">
+                <a:solidFill>
+                  <a:schemeClr val="dk1"/>
+                </a:solidFill>
+                <a:latin typeface="Calibri"/>
+                <a:ea typeface="Calibri"/>
+                <a:cs typeface="Calibri"/>
+                <a:sym typeface="Calibri"/>
+              </a:rPr>
+              <a:t>Ongoing</a:t>
+            </a:r>
+          </a:p>
+          <a:p>
+            <a:pPr indent="0" lvl="0" marL="0" marR="0" rtl="0" algn="l">
+              <a:lnSpc>
+                <a:spcPct val="90000"/>
+              </a:lnSpc>
+              <a:spcBef>
+                <a:spcPts val="0"/>
+              </a:spcBef>
+              <a:buNone/>
+            </a:pPr>
+            <a:r>
+              <a:t/>
+            </a:r>
+            <a:endParaRPr b="0" i="0" sz="1400" u="none" cap="none" strike="noStrike">
+              <a:solidFill>
+                <a:schemeClr val="dk1"/>
+              </a:solidFill>
+              <a:latin typeface="Calibri"/>
+              <a:ea typeface="Calibri"/>
+              <a:cs typeface="Calibri"/>
+              <a:sym typeface="Calibri"/>
+            </a:endParaRPr>
+          </a:p>
+        </p:txBody>
+      </p:sp>
+      <p:sp>
+        <p:nvSpPr>
+          <p:cNvPr id="97" name="Shape 97"/>
+          <p:cNvSpPr txBox="1"/>
+          <p:nvPr>
+            <p:ph idx="1" type="body"/>
+          </p:nvPr>
+        </p:nvSpPr>
+        <p:spPr>
+          <a:xfrm>
+            <a:off x="4611801" y="2843875"/>
+            <a:ext cx="4078200" cy="2292300"/>
+          </a:xfrm>
+          <a:prstGeom prst="rect">
+            <a:avLst/>
+          </a:prstGeom>
+          <a:noFill/>
+          <a:ln>
+            <a:noFill/>
+          </a:ln>
+        </p:spPr>
+        <p:txBody>
+          <a:bodyPr anchorCtr="0" anchor="t" bIns="91425" lIns="91425" rIns="91425" tIns="91425">
+            <a:noAutofit/>
+          </a:bodyPr>
+          <a:lstStyle/>
+          <a:p>
+            <a:pPr indent="-171450" lvl="0" marL="171450" marR="0" rtl="0" algn="l">
+              <a:lnSpc>
+                <a:spcPct val="90000"/>
+              </a:lnSpc>
+              <a:spcBef>
+                <a:spcPts val="0"/>
+              </a:spcBef>
+              <a:spcAft>
+                <a:spcPts val="0"/>
+              </a:spcAft>
+              <a:buClr>
+                <a:schemeClr val="dk1"/>
+              </a:buClr>
+              <a:buSzPct val="25000"/>
+              <a:buFont typeface="Arial"/>
+              <a:buNone/>
+            </a:pPr>
+            <a:r>
+              <a:rPr b="1" i="0" lang="en" sz="1800" u="none" cap="none" strike="noStrike">
+                <a:solidFill>
+                  <a:schemeClr val="dk1"/>
+                </a:solidFill>
+                <a:latin typeface="Calibri"/>
+                <a:ea typeface="Calibri"/>
+                <a:cs typeface="Calibri"/>
+                <a:sym typeface="Calibri"/>
+              </a:rPr>
+              <a:t>Needs</a:t>
+            </a:r>
+          </a:p>
+          <a:p>
+            <a:pPr indent="-317500" lvl="0" marL="457200" marR="0" rtl="0" algn="l">
+              <a:lnSpc>
+                <a:spcPct val="90000"/>
+              </a:lnSpc>
+              <a:spcBef>
+                <a:spcPts val="0"/>
+              </a:spcBef>
+              <a:buSzPct val="100000"/>
+            </a:pPr>
+            <a:r>
+              <a:rPr lang="en" sz="1400"/>
+              <a:t>Figure out which teams have chosen Odoo and which teams have gone a different route.</a:t>
+            </a:r>
+          </a:p>
+          <a:p>
+            <a:pPr indent="0" lvl="0" marL="0" marR="0" rtl="0" algn="l">
+              <a:lnSpc>
+                <a:spcPct val="90000"/>
+              </a:lnSpc>
+              <a:spcBef>
+                <a:spcPts val="0"/>
+              </a:spcBef>
+              <a:buNone/>
+            </a:pPr>
+            <a:r>
+              <a:t/>
+            </a:r>
+            <a:endParaRPr sz="1400"/>
+          </a:p>
+          <a:p>
+            <a:pPr indent="-317500" lvl="0" marL="457200" marR="0" rtl="0" algn="l">
+              <a:lnSpc>
+                <a:spcPct val="90000"/>
+              </a:lnSpc>
+              <a:spcBef>
+                <a:spcPts val="0"/>
+              </a:spcBef>
+              <a:buSzPct val="100000"/>
+            </a:pPr>
+            <a:r>
+              <a:rPr lang="en" sz="1400"/>
+              <a:t>Figure out VM distributions with the rest of the class.</a:t>
+            </a:r>
+          </a:p>
+        </p:txBody>
+      </p:sp>
+      <p:sp>
+        <p:nvSpPr>
+          <p:cNvPr id="98" name="Shape 98"/>
+          <p:cNvSpPr txBox="1"/>
+          <p:nvPr/>
+        </p:nvSpPr>
+        <p:spPr>
+          <a:xfrm>
+            <a:off x="0" y="0"/>
+            <a:ext cx="9144000" cy="619499"/>
+          </a:xfrm>
+          <a:prstGeom prst="rect">
+            <a:avLst/>
+          </a:prstGeom>
+          <a:noFill/>
+          <a:ln>
+            <a:noFill/>
+          </a:ln>
+        </p:spPr>
+        <p:txBody>
+          <a:bodyPr anchorCtr="0" anchor="t" bIns="91425" lIns="91425" rIns="91425" tIns="91425">
+            <a:noAutofit/>
+          </a:bodyPr>
+          <a:lstStyle/>
+          <a:p>
+            <a:pPr indent="0" lvl="0" marL="0" marR="0" rtl="0" algn="ctr">
+              <a:lnSpc>
+                <a:spcPct val="100000"/>
+              </a:lnSpc>
+              <a:spcBef>
+                <a:spcPts val="0"/>
+              </a:spcBef>
+              <a:spcAft>
+                <a:spcPts val="0"/>
+              </a:spcAft>
+              <a:buClr>
+                <a:srgbClr val="000000"/>
+              </a:buClr>
+              <a:buSzPct val="25000"/>
+              <a:buFont typeface="Arial"/>
+              <a:buNone/>
+            </a:pPr>
+            <a:r>
+              <a:rPr b="1" lang="en" sz="2400"/>
+              <a:t>15-02-016</a:t>
+            </a:r>
+          </a:p>
+        </p:txBody>
+      </p:sp>
+    </p:spTree>
+  </p:cSld>
+  <p:clrMapOvr>
+    <a:masterClrMapping/>
+  </p:clrMapOvr>
+  <p:transition spd="slow">
+    <p:cut/>
+  </p:transition>
+</p:sld>
+</file>
+
+<file path=ppt/slides/slide3.xml><?xml version="1.0" encoding="utf-8"?>
+<p:sld xmlns:a="http://schemas.openxmlformats.org/drawingml/2006/main" xmlns:r="http://schemas.openxmlformats.org/officeDocument/2006/relationships" xmlns:mc="http://schemas.openxmlformats.org/markup-compatibility/2006" xmlns:mv="urn:schemas-microsoft-com:mac:vml" xmlns:p="http://schemas.openxmlformats.org/presentationml/2006/main" xmlns:c="http://schemas.openxmlformats.org/drawingml/2006/chart" xmlns:dgm="http://schemas.openxmlformats.org/drawingml/2006/diagram" xmlns:o="urn:schemas-microsoft-com:office:office" xmlns:v="urn:schemas-microsoft-com:vml" xmlns:pvml="urn:schemas-microsoft-com:office:powerpoint" xmlns:com="http://schemas.openxmlformats.org/drawingml/2006/compatibility" xmlns:p14="http://schemas.microsoft.com/office/powerpoint/2010/main">
+  <p:cSld>
+    <p:spTree>
+      <p:nvGrpSpPr>
+        <p:cNvPr id="102" name="Shape 102"/>
+        <p:cNvGrpSpPr/>
+        <p:nvPr/>
+      </p:nvGrpSpPr>
+      <p:grpSpPr>
+        <a:xfrm>
+          <a:off x="0" y="0"/>
+          <a:ext cx="0" cy="0"/>
+          <a:chOff x="0" y="0"/>
+          <a:chExt cx="0" cy="0"/>
+        </a:xfrm>
+      </p:grpSpPr>
+      <p:sp>
+        <p:nvSpPr>
+          <p:cNvPr id="103" name="Shape 103"/>
+          <p:cNvSpPr txBox="1"/>
+          <p:nvPr>
+            <p:ph idx="1" type="body"/>
+          </p:nvPr>
+        </p:nvSpPr>
+        <p:spPr>
+          <a:xfrm>
+            <a:off x="437464" y="542937"/>
             <a:ext cx="4077600" cy="2291998"/>
           </a:xfrm>
           <a:prstGeom prst="rect">
@@ -13773,7 +14341,7 @@
       </p:sp>
       <p:sp>
         <p:nvSpPr>
-          <p:cNvPr id="95" name="Shape 95"/>
+          <p:cNvPr id="104" name="Shape 104"/>
           <p:cNvSpPr txBox="1"/>
           <p:nvPr>
             <p:ph idx="1" type="body"/>
@@ -13866,7 +14434,7 @@
       </p:sp>
       <p:sp>
         <p:nvSpPr>
-          <p:cNvPr id="96" name="Shape 96"/>
+          <p:cNvPr id="105" name="Shape 105"/>
           <p:cNvSpPr txBox="1"/>
           <p:nvPr>
             <p:ph idx="1" type="body"/>
@@ -13961,7 +14529,7 @@
       </p:sp>
       <p:sp>
         <p:nvSpPr>
-          <p:cNvPr id="97" name="Shape 97"/>
+          <p:cNvPr id="106" name="Shape 106"/>
           <p:cNvSpPr txBox="1"/>
           <p:nvPr>
             <p:ph idx="1" type="body"/>
@@ -14040,7 +14608,7 @@
       </p:sp>
       <p:sp>
         <p:nvSpPr>
-          <p:cNvPr id="98" name="Shape 98"/>
+          <p:cNvPr id="107" name="Shape 107"/>
           <p:cNvSpPr txBox="1"/>
           <p:nvPr/>
         </p:nvSpPr>

</xml_diff>